<commit_message>
#1 - data collection section finished
- wahay! now I can move onto more interesting sections
</commit_message>
<xml_diff>
--- a/laboratory_project/report/observations/diagrams.pptx
+++ b/laboratory_project/report/observations/diagrams.pptx
@@ -5,10 +5,11 @@
     <p:sldMasterId id="2147483648" r:id="rId1"/>
   </p:sldMasterIdLst>
   <p:notesMasterIdLst>
-    <p:notesMasterId r:id="rId3"/>
+    <p:notesMasterId r:id="rId4"/>
   </p:notesMasterIdLst>
   <p:sldIdLst>
     <p:sldId id="256" r:id="rId2"/>
+    <p:sldId id="257" r:id="rId3"/>
   </p:sldIdLst>
   <p:sldSz cx="12192000" cy="6858000"/>
   <p:notesSz cx="6858000" cy="9144000"/>
@@ -197,7 +198,7 @@
           <a:p>
             <a:fld id="{1D63773A-98AB-E940-87E9-7E718E4926FF}" type="datetimeFigureOut">
               <a:rPr lang="en-GB" smtClean="0"/>
-              <a:t>27/12/2017</a:t>
+              <a:t>28/12/2017</a:t>
             </a:fld>
             <a:endParaRPr lang="en-GB"/>
           </a:p>
@@ -680,7 +681,7 @@
           <a:p>
             <a:fld id="{36593596-8FBE-7A4B-8A4D-8A890AC13AF4}" type="datetimeFigureOut">
               <a:rPr lang="en-GB" smtClean="0"/>
-              <a:t>27/12/2017</a:t>
+              <a:t>28/12/2017</a:t>
             </a:fld>
             <a:endParaRPr lang="en-GB"/>
           </a:p>
@@ -850,7 +851,7 @@
           <a:p>
             <a:fld id="{36593596-8FBE-7A4B-8A4D-8A890AC13AF4}" type="datetimeFigureOut">
               <a:rPr lang="en-GB" smtClean="0"/>
-              <a:t>27/12/2017</a:t>
+              <a:t>28/12/2017</a:t>
             </a:fld>
             <a:endParaRPr lang="en-GB"/>
           </a:p>
@@ -1030,7 +1031,7 @@
           <a:p>
             <a:fld id="{36593596-8FBE-7A4B-8A4D-8A890AC13AF4}" type="datetimeFigureOut">
               <a:rPr lang="en-GB" smtClean="0"/>
-              <a:t>27/12/2017</a:t>
+              <a:t>28/12/2017</a:t>
             </a:fld>
             <a:endParaRPr lang="en-GB"/>
           </a:p>
@@ -1200,7 +1201,7 @@
           <a:p>
             <a:fld id="{36593596-8FBE-7A4B-8A4D-8A890AC13AF4}" type="datetimeFigureOut">
               <a:rPr lang="en-GB" smtClean="0"/>
-              <a:t>27/12/2017</a:t>
+              <a:t>28/12/2017</a:t>
             </a:fld>
             <a:endParaRPr lang="en-GB"/>
           </a:p>
@@ -1446,7 +1447,7 @@
           <a:p>
             <a:fld id="{36593596-8FBE-7A4B-8A4D-8A890AC13AF4}" type="datetimeFigureOut">
               <a:rPr lang="en-GB" smtClean="0"/>
-              <a:t>27/12/2017</a:t>
+              <a:t>28/12/2017</a:t>
             </a:fld>
             <a:endParaRPr lang="en-GB"/>
           </a:p>
@@ -1678,7 +1679,7 @@
           <a:p>
             <a:fld id="{36593596-8FBE-7A4B-8A4D-8A890AC13AF4}" type="datetimeFigureOut">
               <a:rPr lang="en-GB" smtClean="0"/>
-              <a:t>27/12/2017</a:t>
+              <a:t>28/12/2017</a:t>
             </a:fld>
             <a:endParaRPr lang="en-GB"/>
           </a:p>
@@ -2045,7 +2046,7 @@
           <a:p>
             <a:fld id="{36593596-8FBE-7A4B-8A4D-8A890AC13AF4}" type="datetimeFigureOut">
               <a:rPr lang="en-GB" smtClean="0"/>
-              <a:t>27/12/2017</a:t>
+              <a:t>28/12/2017</a:t>
             </a:fld>
             <a:endParaRPr lang="en-GB"/>
           </a:p>
@@ -2163,7 +2164,7 @@
           <a:p>
             <a:fld id="{36593596-8FBE-7A4B-8A4D-8A890AC13AF4}" type="datetimeFigureOut">
               <a:rPr lang="en-GB" smtClean="0"/>
-              <a:t>27/12/2017</a:t>
+              <a:t>28/12/2017</a:t>
             </a:fld>
             <a:endParaRPr lang="en-GB"/>
           </a:p>
@@ -2258,7 +2259,7 @@
           <a:p>
             <a:fld id="{36593596-8FBE-7A4B-8A4D-8A890AC13AF4}" type="datetimeFigureOut">
               <a:rPr lang="en-GB" smtClean="0"/>
-              <a:t>27/12/2017</a:t>
+              <a:t>28/12/2017</a:t>
             </a:fld>
             <a:endParaRPr lang="en-GB"/>
           </a:p>
@@ -2535,7 +2536,7 @@
           <a:p>
             <a:fld id="{36593596-8FBE-7A4B-8A4D-8A890AC13AF4}" type="datetimeFigureOut">
               <a:rPr lang="en-GB" smtClean="0"/>
-              <a:t>27/12/2017</a:t>
+              <a:t>28/12/2017</a:t>
             </a:fld>
             <a:endParaRPr lang="en-GB"/>
           </a:p>
@@ -2788,7 +2789,7 @@
           <a:p>
             <a:fld id="{36593596-8FBE-7A4B-8A4D-8A890AC13AF4}" type="datetimeFigureOut">
               <a:rPr lang="en-GB" smtClean="0"/>
-              <a:t>27/12/2017</a:t>
+              <a:t>28/12/2017</a:t>
             </a:fld>
             <a:endParaRPr lang="en-GB"/>
           </a:p>
@@ -3001,7 +3002,7 @@
           <a:p>
             <a:fld id="{36593596-8FBE-7A4B-8A4D-8A890AC13AF4}" type="datetimeFigureOut">
               <a:rPr lang="en-GB" smtClean="0"/>
-              <a:t>27/12/2017</a:t>
+              <a:t>28/12/2017</a:t>
             </a:fld>
             <a:endParaRPr lang="en-GB"/>
           </a:p>
@@ -4412,6 +4413,65 @@
 </p:sld>
 </file>
 
+<file path=ppt/slides/slide2.xml><?xml version="1.0" encoding="utf-8"?>
+<p:sld xmlns:a="http://schemas.openxmlformats.org/drawingml/2006/main" xmlns:r="http://schemas.openxmlformats.org/officeDocument/2006/relationships" xmlns:p="http://schemas.openxmlformats.org/presentationml/2006/main">
+  <p:cSld>
+    <p:spTree>
+      <p:nvGrpSpPr>
+        <p:cNvPr id="1" name=""/>
+        <p:cNvGrpSpPr/>
+        <p:nvPr/>
+      </p:nvGrpSpPr>
+      <p:grpSpPr>
+        <a:xfrm>
+          <a:off x="0" y="0"/>
+          <a:ext cx="0" cy="0"/>
+          <a:chOff x="0" y="0"/>
+          <a:chExt cx="0" cy="0"/>
+        </a:xfrm>
+      </p:grpSpPr>
+      <p:pic>
+        <p:nvPicPr>
+          <p:cNvPr id="4" name="Picture 3"/>
+          <p:cNvPicPr>
+            <a:picLocks noChangeAspect="1"/>
+          </p:cNvPicPr>
+          <p:nvPr/>
+        </p:nvPicPr>
+        <p:blipFill rotWithShape="1">
+          <a:blip r:embed="rId2">
+            <a:extLst>
+              <a:ext uri="{28A0092B-C50C-407E-A947-70E740481C1C}">
+                <a14:useLocalDpi xmlns:a14="http://schemas.microsoft.com/office/drawing/2010/main" val="0"/>
+              </a:ext>
+            </a:extLst>
+          </a:blip>
+          <a:srcRect b="5505"/>
+          <a:stretch/>
+        </p:blipFill>
+        <p:spPr>
+          <a:xfrm>
+            <a:off x="3543300" y="2044700"/>
+            <a:ext cx="5105400" cy="2616200"/>
+          </a:xfrm>
+          <a:prstGeom prst="rect">
+            <a:avLst/>
+          </a:prstGeom>
+        </p:spPr>
+      </p:pic>
+    </p:spTree>
+    <p:extLst>
+      <p:ext uri="{BB962C8B-B14F-4D97-AF65-F5344CB8AC3E}">
+        <p14:creationId xmlns:p14="http://schemas.microsoft.com/office/powerpoint/2010/main" val="1233799072"/>
+      </p:ext>
+    </p:extLst>
+  </p:cSld>
+  <p:clrMapOvr>
+    <a:masterClrMapping/>
+  </p:clrMapOvr>
+</p:sld>
+</file>
+
 <file path=ppt/theme/theme1.xml><?xml version="1.0" encoding="utf-8"?>
 <a:theme xmlns:a="http://schemas.openxmlformats.org/drawingml/2006/main" name="Office Theme">
   <a:themeElements>

</xml_diff>

<commit_message>
#4 - special cool graph added to observation section
- signal to noise graph and an annulus thing
</commit_message>
<xml_diff>
--- a/laboratory_project/report/observations/diagrams.pptx
+++ b/laboratory_project/report/observations/diagrams.pptx
@@ -5,11 +5,13 @@
     <p:sldMasterId id="2147483648" r:id="rId1"/>
   </p:sldMasterIdLst>
   <p:notesMasterIdLst>
-    <p:notesMasterId r:id="rId4"/>
+    <p:notesMasterId r:id="rId6"/>
   </p:notesMasterIdLst>
   <p:sldIdLst>
     <p:sldId id="256" r:id="rId2"/>
     <p:sldId id="257" r:id="rId3"/>
+    <p:sldId id="258" r:id="rId4"/>
+    <p:sldId id="259" r:id="rId5"/>
   </p:sldIdLst>
   <p:sldSz cx="12192000" cy="6858000"/>
   <p:notesSz cx="6858000" cy="9144000"/>
@@ -198,7 +200,7 @@
           <a:p>
             <a:fld id="{1D63773A-98AB-E940-87E9-7E718E4926FF}" type="datetimeFigureOut">
               <a:rPr lang="en-GB" smtClean="0"/>
-              <a:t>28/12/2017</a:t>
+              <a:t>30/12/2017</a:t>
             </a:fld>
             <a:endParaRPr lang="en-GB"/>
           </a:p>
@@ -681,7 +683,7 @@
           <a:p>
             <a:fld id="{36593596-8FBE-7A4B-8A4D-8A890AC13AF4}" type="datetimeFigureOut">
               <a:rPr lang="en-GB" smtClean="0"/>
-              <a:t>28/12/2017</a:t>
+              <a:t>30/12/2017</a:t>
             </a:fld>
             <a:endParaRPr lang="en-GB"/>
           </a:p>
@@ -851,7 +853,7 @@
           <a:p>
             <a:fld id="{36593596-8FBE-7A4B-8A4D-8A890AC13AF4}" type="datetimeFigureOut">
               <a:rPr lang="en-GB" smtClean="0"/>
-              <a:t>28/12/2017</a:t>
+              <a:t>30/12/2017</a:t>
             </a:fld>
             <a:endParaRPr lang="en-GB"/>
           </a:p>
@@ -1031,7 +1033,7 @@
           <a:p>
             <a:fld id="{36593596-8FBE-7A4B-8A4D-8A890AC13AF4}" type="datetimeFigureOut">
               <a:rPr lang="en-GB" smtClean="0"/>
-              <a:t>28/12/2017</a:t>
+              <a:t>30/12/2017</a:t>
             </a:fld>
             <a:endParaRPr lang="en-GB"/>
           </a:p>
@@ -1201,7 +1203,7 @@
           <a:p>
             <a:fld id="{36593596-8FBE-7A4B-8A4D-8A890AC13AF4}" type="datetimeFigureOut">
               <a:rPr lang="en-GB" smtClean="0"/>
-              <a:t>28/12/2017</a:t>
+              <a:t>30/12/2017</a:t>
             </a:fld>
             <a:endParaRPr lang="en-GB"/>
           </a:p>
@@ -1447,7 +1449,7 @@
           <a:p>
             <a:fld id="{36593596-8FBE-7A4B-8A4D-8A890AC13AF4}" type="datetimeFigureOut">
               <a:rPr lang="en-GB" smtClean="0"/>
-              <a:t>28/12/2017</a:t>
+              <a:t>30/12/2017</a:t>
             </a:fld>
             <a:endParaRPr lang="en-GB"/>
           </a:p>
@@ -1679,7 +1681,7 @@
           <a:p>
             <a:fld id="{36593596-8FBE-7A4B-8A4D-8A890AC13AF4}" type="datetimeFigureOut">
               <a:rPr lang="en-GB" smtClean="0"/>
-              <a:t>28/12/2017</a:t>
+              <a:t>30/12/2017</a:t>
             </a:fld>
             <a:endParaRPr lang="en-GB"/>
           </a:p>
@@ -2046,7 +2048,7 @@
           <a:p>
             <a:fld id="{36593596-8FBE-7A4B-8A4D-8A890AC13AF4}" type="datetimeFigureOut">
               <a:rPr lang="en-GB" smtClean="0"/>
-              <a:t>28/12/2017</a:t>
+              <a:t>30/12/2017</a:t>
             </a:fld>
             <a:endParaRPr lang="en-GB"/>
           </a:p>
@@ -2164,7 +2166,7 @@
           <a:p>
             <a:fld id="{36593596-8FBE-7A4B-8A4D-8A890AC13AF4}" type="datetimeFigureOut">
               <a:rPr lang="en-GB" smtClean="0"/>
-              <a:t>28/12/2017</a:t>
+              <a:t>30/12/2017</a:t>
             </a:fld>
             <a:endParaRPr lang="en-GB"/>
           </a:p>
@@ -2259,7 +2261,7 @@
           <a:p>
             <a:fld id="{36593596-8FBE-7A4B-8A4D-8A890AC13AF4}" type="datetimeFigureOut">
               <a:rPr lang="en-GB" smtClean="0"/>
-              <a:t>28/12/2017</a:t>
+              <a:t>30/12/2017</a:t>
             </a:fld>
             <a:endParaRPr lang="en-GB"/>
           </a:p>
@@ -2536,7 +2538,7 @@
           <a:p>
             <a:fld id="{36593596-8FBE-7A4B-8A4D-8A890AC13AF4}" type="datetimeFigureOut">
               <a:rPr lang="en-GB" smtClean="0"/>
-              <a:t>28/12/2017</a:t>
+              <a:t>30/12/2017</a:t>
             </a:fld>
             <a:endParaRPr lang="en-GB"/>
           </a:p>
@@ -2789,7 +2791,7 @@
           <a:p>
             <a:fld id="{36593596-8FBE-7A4B-8A4D-8A890AC13AF4}" type="datetimeFigureOut">
               <a:rPr lang="en-GB" smtClean="0"/>
-              <a:t>28/12/2017</a:t>
+              <a:t>30/12/2017</a:t>
             </a:fld>
             <a:endParaRPr lang="en-GB"/>
           </a:p>
@@ -3002,7 +3004,7 @@
           <a:p>
             <a:fld id="{36593596-8FBE-7A4B-8A4D-8A890AC13AF4}" type="datetimeFigureOut">
               <a:rPr lang="en-GB" smtClean="0"/>
-              <a:t>28/12/2017</a:t>
+              <a:t>30/12/2017</a:t>
             </a:fld>
             <a:endParaRPr lang="en-GB"/>
           </a:p>
@@ -4472,6 +4474,552 @@
 </p:sld>
 </file>
 
+<file path=ppt/slides/slide3.xml><?xml version="1.0" encoding="utf-8"?>
+<p:sld xmlns:a="http://schemas.openxmlformats.org/drawingml/2006/main" xmlns:r="http://schemas.openxmlformats.org/officeDocument/2006/relationships" xmlns:p="http://schemas.openxmlformats.org/presentationml/2006/main">
+  <p:cSld>
+    <p:spTree>
+      <p:nvGrpSpPr>
+        <p:cNvPr id="1" name=""/>
+        <p:cNvGrpSpPr/>
+        <p:nvPr/>
+      </p:nvGrpSpPr>
+      <p:grpSpPr>
+        <a:xfrm>
+          <a:off x="0" y="0"/>
+          <a:ext cx="0" cy="0"/>
+          <a:chOff x="0" y="0"/>
+          <a:chExt cx="0" cy="0"/>
+        </a:xfrm>
+      </p:grpSpPr>
+      <p:grpSp>
+        <p:nvGrpSpPr>
+          <p:cNvPr id="17" name="Group 16"/>
+          <p:cNvGrpSpPr/>
+          <p:nvPr/>
+        </p:nvGrpSpPr>
+        <p:grpSpPr>
+          <a:xfrm>
+            <a:off x="2278084" y="1213300"/>
+            <a:ext cx="7315200" cy="2743437"/>
+            <a:chOff x="2278084" y="1213300"/>
+            <a:chExt cx="7315200" cy="2743437"/>
+          </a:xfrm>
+        </p:grpSpPr>
+        <p:grpSp>
+          <p:nvGrpSpPr>
+            <p:cNvPr id="15" name="Group 14"/>
+            <p:cNvGrpSpPr/>
+            <p:nvPr/>
+          </p:nvGrpSpPr>
+          <p:grpSpPr>
+            <a:xfrm>
+              <a:off x="2278084" y="1213300"/>
+              <a:ext cx="7315200" cy="2743437"/>
+              <a:chOff x="1247937" y="3458788"/>
+              <a:chExt cx="7315200" cy="2743437"/>
+            </a:xfrm>
+          </p:grpSpPr>
+          <p:pic>
+            <p:nvPicPr>
+              <p:cNvPr id="11" name="Picture 10"/>
+              <p:cNvPicPr>
+                <a:picLocks noChangeAspect="1"/>
+              </p:cNvPicPr>
+              <p:nvPr/>
+            </p:nvPicPr>
+            <p:blipFill>
+              <a:blip r:embed="rId2">
+                <a:extLst>
+                  <a:ext uri="{28A0092B-C50C-407E-A947-70E740481C1C}">
+                    <a14:useLocalDpi xmlns:a14="http://schemas.microsoft.com/office/drawing/2010/main" val="0"/>
+                  </a:ext>
+                </a:extLst>
+              </a:blip>
+              <a:stretch>
+                <a:fillRect/>
+              </a:stretch>
+            </p:blipFill>
+            <p:spPr>
+              <a:xfrm>
+                <a:off x="1247937" y="3458788"/>
+                <a:ext cx="7315200" cy="2743200"/>
+              </a:xfrm>
+              <a:prstGeom prst="rect">
+                <a:avLst/>
+              </a:prstGeom>
+            </p:spPr>
+          </p:pic>
+          <p:pic>
+            <p:nvPicPr>
+              <p:cNvPr id="10" name="Picture 9"/>
+              <p:cNvPicPr>
+                <a:picLocks noChangeAspect="1"/>
+              </p:cNvPicPr>
+              <p:nvPr/>
+            </p:nvPicPr>
+            <p:blipFill rotWithShape="1">
+              <a:blip r:embed="rId3">
+                <a:alphaModFix/>
+                <a:extLst>
+                  <a:ext uri="{28A0092B-C50C-407E-A947-70E740481C1C}">
+                    <a14:useLocalDpi xmlns:a14="http://schemas.microsoft.com/office/drawing/2010/main" val="0"/>
+                  </a:ext>
+                </a:extLst>
+              </a:blip>
+              <a:srcRect r="9686"/>
+              <a:stretch/>
+            </p:blipFill>
+            <p:spPr>
+              <a:xfrm>
+                <a:off x="1524000" y="3459025"/>
+                <a:ext cx="4381500" cy="2743200"/>
+              </a:xfrm>
+              <a:prstGeom prst="rect">
+                <a:avLst/>
+              </a:prstGeom>
+            </p:spPr>
+          </p:pic>
+        </p:grpSp>
+        <p:sp>
+          <p:nvSpPr>
+            <p:cNvPr id="12" name="Rectangle 11"/>
+            <p:cNvSpPr/>
+            <p:nvPr/>
+          </p:nvSpPr>
+          <p:spPr>
+            <a:xfrm>
+              <a:off x="6935647" y="3653062"/>
+              <a:ext cx="2019300" cy="282956"/>
+            </a:xfrm>
+            <a:prstGeom prst="rect">
+              <a:avLst/>
+            </a:prstGeom>
+            <a:solidFill>
+              <a:schemeClr val="bg1"/>
+            </a:solidFill>
+            <a:ln>
+              <a:noFill/>
+            </a:ln>
+          </p:spPr>
+          <p:style>
+            <a:lnRef idx="2">
+              <a:schemeClr val="accent1">
+                <a:shade val="50000"/>
+              </a:schemeClr>
+            </a:lnRef>
+            <a:fillRef idx="1">
+              <a:schemeClr val="accent1"/>
+            </a:fillRef>
+            <a:effectRef idx="0">
+              <a:schemeClr val="accent1"/>
+            </a:effectRef>
+            <a:fontRef idx="minor">
+              <a:schemeClr val="lt1"/>
+            </a:fontRef>
+          </p:style>
+          <p:txBody>
+            <a:bodyPr rtlCol="0" anchor="ctr"/>
+            <a:lstStyle/>
+            <a:p>
+              <a:pPr algn="ctr"/>
+              <a:endParaRPr lang="en-GB"/>
+            </a:p>
+          </p:txBody>
+        </p:sp>
+        <p:pic>
+          <p:nvPicPr>
+            <p:cNvPr id="14" name="Picture 13"/>
+            <p:cNvPicPr>
+              <a:picLocks/>
+            </p:cNvPicPr>
+            <p:nvPr/>
+          </p:nvPicPr>
+          <p:blipFill rotWithShape="1">
+            <a:blip r:embed="rId4">
+              <a:extLst>
+                <a:ext uri="{28A0092B-C50C-407E-A947-70E740481C1C}">
+                  <a14:useLocalDpi xmlns:a14="http://schemas.microsoft.com/office/drawing/2010/main" val="0"/>
+                </a:ext>
+              </a:extLst>
+            </a:blip>
+            <a:srcRect l="34759" t="15276" r="30596" b="38132"/>
+            <a:stretch/>
+          </p:blipFill>
+          <p:spPr>
+            <a:xfrm>
+              <a:off x="6936052" y="1546825"/>
+              <a:ext cx="1911599" cy="2098800"/>
+            </a:xfrm>
+            <a:prstGeom prst="rect">
+              <a:avLst/>
+            </a:prstGeom>
+          </p:spPr>
+        </p:pic>
+        <p:sp>
+          <p:nvSpPr>
+            <p:cNvPr id="16" name="Rectangle 15"/>
+            <p:cNvSpPr/>
+            <p:nvPr/>
+          </p:nvSpPr>
+          <p:spPr>
+            <a:xfrm>
+              <a:off x="6924071" y="1546825"/>
+              <a:ext cx="1923579" cy="2106237"/>
+            </a:xfrm>
+            <a:prstGeom prst="rect">
+              <a:avLst/>
+            </a:prstGeom>
+            <a:noFill/>
+          </p:spPr>
+          <p:style>
+            <a:lnRef idx="2">
+              <a:schemeClr val="accent1">
+                <a:shade val="50000"/>
+              </a:schemeClr>
+            </a:lnRef>
+            <a:fillRef idx="1">
+              <a:schemeClr val="accent1"/>
+            </a:fillRef>
+            <a:effectRef idx="0">
+              <a:schemeClr val="accent1"/>
+            </a:effectRef>
+            <a:fontRef idx="minor">
+              <a:schemeClr val="lt1"/>
+            </a:fontRef>
+          </p:style>
+          <p:txBody>
+            <a:bodyPr rtlCol="0" anchor="ctr"/>
+            <a:lstStyle/>
+            <a:p>
+              <a:pPr algn="ctr"/>
+              <a:endParaRPr lang="en-GB"/>
+            </a:p>
+          </p:txBody>
+        </p:sp>
+      </p:grpSp>
+      <p:pic>
+        <p:nvPicPr>
+          <p:cNvPr id="19" name="Picture 18"/>
+          <p:cNvPicPr>
+            <a:picLocks noChangeAspect="1"/>
+          </p:cNvPicPr>
+          <p:nvPr/>
+        </p:nvPicPr>
+        <p:blipFill rotWithShape="1">
+          <a:blip r:embed="rId5">
+            <a:extLst>
+              <a:ext uri="{28A0092B-C50C-407E-A947-70E740481C1C}">
+                <a14:useLocalDpi xmlns:a14="http://schemas.microsoft.com/office/drawing/2010/main" val="0"/>
+              </a:ext>
+            </a:extLst>
+          </a:blip>
+          <a:srcRect l="32895" t="94784" r="30421" b="1732"/>
+          <a:stretch/>
+        </p:blipFill>
+        <p:spPr>
+          <a:xfrm>
+            <a:off x="3540432" y="3956499"/>
+            <a:ext cx="3115011" cy="221877"/>
+          </a:xfrm>
+          <a:prstGeom prst="rect">
+            <a:avLst/>
+          </a:prstGeom>
+        </p:spPr>
+      </p:pic>
+    </p:spTree>
+    <p:extLst>
+      <p:ext uri="{BB962C8B-B14F-4D97-AF65-F5344CB8AC3E}">
+        <p14:creationId xmlns:p14="http://schemas.microsoft.com/office/powerpoint/2010/main" val="1001300734"/>
+      </p:ext>
+    </p:extLst>
+  </p:cSld>
+  <p:clrMapOvr>
+    <a:masterClrMapping/>
+  </p:clrMapOvr>
+</p:sld>
+</file>
+
+<file path=ppt/slides/slide4.xml><?xml version="1.0" encoding="utf-8"?>
+<p:sld xmlns:a="http://schemas.openxmlformats.org/drawingml/2006/main" xmlns:r="http://schemas.openxmlformats.org/officeDocument/2006/relationships" xmlns:p="http://schemas.openxmlformats.org/presentationml/2006/main">
+  <p:cSld>
+    <p:spTree>
+      <p:nvGrpSpPr>
+        <p:cNvPr id="1" name=""/>
+        <p:cNvGrpSpPr/>
+        <p:nvPr/>
+      </p:nvGrpSpPr>
+      <p:grpSpPr>
+        <a:xfrm>
+          <a:off x="0" y="0"/>
+          <a:ext cx="0" cy="0"/>
+          <a:chOff x="0" y="0"/>
+          <a:chExt cx="0" cy="0"/>
+        </a:xfrm>
+      </p:grpSpPr>
+      <p:pic>
+        <p:nvPicPr>
+          <p:cNvPr id="5" name="Picture 4"/>
+          <p:cNvPicPr>
+            <a:picLocks noChangeAspect="1"/>
+          </p:cNvPicPr>
+          <p:nvPr/>
+        </p:nvPicPr>
+        <p:blipFill rotWithShape="1">
+          <a:blip r:embed="rId2">
+            <a:extLst>
+              <a:ext uri="{28A0092B-C50C-407E-A947-70E740481C1C}">
+                <a14:useLocalDpi xmlns:a14="http://schemas.microsoft.com/office/drawing/2010/main" val="0"/>
+              </a:ext>
+            </a:extLst>
+          </a:blip>
+          <a:srcRect l="32895" t="93559" r="30421"/>
+          <a:stretch/>
+        </p:blipFill>
+        <p:spPr>
+          <a:xfrm>
+            <a:off x="7445894" y="154045"/>
+            <a:ext cx="2683485" cy="353388"/>
+          </a:xfrm>
+          <a:prstGeom prst="rect">
+            <a:avLst/>
+          </a:prstGeom>
+        </p:spPr>
+      </p:pic>
+      <p:pic>
+        <p:nvPicPr>
+          <p:cNvPr id="6" name="Picture 5"/>
+          <p:cNvPicPr>
+            <a:picLocks noChangeAspect="1"/>
+          </p:cNvPicPr>
+          <p:nvPr/>
+        </p:nvPicPr>
+        <p:blipFill rotWithShape="1">
+          <a:blip r:embed="rId3">
+            <a:extLst>
+              <a:ext uri="{28A0092B-C50C-407E-A947-70E740481C1C}">
+                <a14:useLocalDpi xmlns:a14="http://schemas.microsoft.com/office/drawing/2010/main" val="0"/>
+              </a:ext>
+            </a:extLst>
+          </a:blip>
+          <a:srcRect l="4009" t="8331" r="8808"/>
+          <a:stretch/>
+        </p:blipFill>
+        <p:spPr>
+          <a:xfrm>
+            <a:off x="2731624" y="2210764"/>
+            <a:ext cx="6377651" cy="2666035"/>
+          </a:xfrm>
+          <a:prstGeom prst="rect">
+            <a:avLst/>
+          </a:prstGeom>
+        </p:spPr>
+      </p:pic>
+      <p:pic>
+        <p:nvPicPr>
+          <p:cNvPr id="7" name="Picture 6"/>
+          <p:cNvPicPr>
+            <a:picLocks noChangeAspect="1"/>
+          </p:cNvPicPr>
+          <p:nvPr/>
+        </p:nvPicPr>
+        <p:blipFill rotWithShape="1">
+          <a:blip r:embed="rId2">
+            <a:extLst>
+              <a:ext uri="{28A0092B-C50C-407E-A947-70E740481C1C}">
+                <a14:useLocalDpi xmlns:a14="http://schemas.microsoft.com/office/drawing/2010/main" val="0"/>
+              </a:ext>
+            </a:extLst>
+          </a:blip>
+          <a:srcRect l="32895" t="94784" r="30421" b="1732"/>
+          <a:stretch/>
+        </p:blipFill>
+        <p:spPr>
+          <a:xfrm>
+            <a:off x="7230130" y="830466"/>
+            <a:ext cx="3115011" cy="221877"/>
+          </a:xfrm>
+          <a:prstGeom prst="rect">
+            <a:avLst/>
+          </a:prstGeom>
+        </p:spPr>
+      </p:pic>
+      <p:grpSp>
+        <p:nvGrpSpPr>
+          <p:cNvPr id="11" name="Group 10"/>
+          <p:cNvGrpSpPr/>
+          <p:nvPr/>
+        </p:nvGrpSpPr>
+        <p:grpSpPr>
+          <a:xfrm>
+            <a:off x="2731624" y="2210764"/>
+            <a:ext cx="6377651" cy="2691436"/>
+            <a:chOff x="2731624" y="2210764"/>
+            <a:chExt cx="6377651" cy="2691436"/>
+          </a:xfrm>
+        </p:grpSpPr>
+        <p:pic>
+          <p:nvPicPr>
+            <p:cNvPr id="8" name="Picture 7"/>
+            <p:cNvPicPr>
+              <a:picLocks noChangeAspect="1"/>
+            </p:cNvPicPr>
+            <p:nvPr/>
+          </p:nvPicPr>
+          <p:blipFill rotWithShape="1">
+            <a:blip r:embed="rId4">
+              <a:extLst>
+                <a:ext uri="{28A0092B-C50C-407E-A947-70E740481C1C}">
+                  <a14:useLocalDpi xmlns:a14="http://schemas.microsoft.com/office/drawing/2010/main" val="0"/>
+                </a:ext>
+              </a:extLst>
+            </a:blip>
+            <a:srcRect l="4009" t="9046" r="8808"/>
+            <a:stretch/>
+          </p:blipFill>
+          <p:spPr>
+            <a:xfrm>
+              <a:off x="2731624" y="2210764"/>
+              <a:ext cx="6377651" cy="2691436"/>
+            </a:xfrm>
+            <a:prstGeom prst="rect">
+              <a:avLst/>
+            </a:prstGeom>
+          </p:spPr>
+        </p:pic>
+        <p:sp>
+          <p:nvSpPr>
+            <p:cNvPr id="9" name="TextBox 8"/>
+            <p:cNvSpPr txBox="1"/>
+            <p:nvPr/>
+          </p:nvSpPr>
+          <p:spPr>
+            <a:xfrm>
+              <a:off x="3297363" y="2268637"/>
+              <a:ext cx="508473" cy="400110"/>
+            </a:xfrm>
+            <a:prstGeom prst="rect">
+              <a:avLst/>
+            </a:prstGeom>
+            <a:noFill/>
+          </p:spPr>
+          <p:txBody>
+            <a:bodyPr wrap="none" rtlCol="0">
+              <a:spAutoFit/>
+            </a:bodyPr>
+            <a:lstStyle/>
+            <a:p>
+              <a:r>
+                <a:rPr lang="en-GB" sz="2000" b="1" dirty="0" smtClean="0">
+                  <a:latin typeface="CMU Serif Extra BoldNonextended" charset="0"/>
+                  <a:ea typeface="CMU Serif Extra BoldNonextended" charset="0"/>
+                  <a:cs typeface="CMU Serif Extra BoldNonextended" charset="0"/>
+                </a:rPr>
+                <a:t>(a)</a:t>
+              </a:r>
+              <a:endParaRPr lang="en-GB" sz="2000" b="1" dirty="0">
+                <a:latin typeface="CMU Serif Extra BoldNonextended" charset="0"/>
+                <a:ea typeface="CMU Serif Extra BoldNonextended" charset="0"/>
+                <a:cs typeface="CMU Serif Extra BoldNonextended" charset="0"/>
+              </a:endParaRPr>
+            </a:p>
+          </p:txBody>
+        </p:sp>
+        <p:sp>
+          <p:nvSpPr>
+            <p:cNvPr id="10" name="TextBox 9"/>
+            <p:cNvSpPr txBox="1"/>
+            <p:nvPr/>
+          </p:nvSpPr>
+          <p:spPr>
+            <a:xfrm>
+              <a:off x="7072639" y="2271922"/>
+              <a:ext cx="526106" cy="400110"/>
+            </a:xfrm>
+            <a:prstGeom prst="rect">
+              <a:avLst/>
+            </a:prstGeom>
+            <a:noFill/>
+          </p:spPr>
+          <p:txBody>
+            <a:bodyPr wrap="none" rtlCol="0">
+              <a:spAutoFit/>
+            </a:bodyPr>
+            <a:lstStyle/>
+            <a:p>
+              <a:r>
+                <a:rPr lang="en-GB" sz="2000" b="1" dirty="0" smtClean="0">
+                  <a:solidFill>
+                    <a:schemeClr val="bg1"/>
+                  </a:solidFill>
+                  <a:latin typeface="CMU Serif Extra BoldNonextended" charset="0"/>
+                  <a:ea typeface="CMU Serif Extra BoldNonextended" charset="0"/>
+                  <a:cs typeface="CMU Serif Extra BoldNonextended" charset="0"/>
+                </a:rPr>
+                <a:t>(b)</a:t>
+              </a:r>
+              <a:endParaRPr lang="en-GB" sz="2000" b="1" dirty="0">
+                <a:solidFill>
+                  <a:schemeClr val="bg1"/>
+                </a:solidFill>
+                <a:latin typeface="CMU Serif Extra BoldNonextended" charset="0"/>
+                <a:ea typeface="CMU Serif Extra BoldNonextended" charset="0"/>
+                <a:cs typeface="CMU Serif Extra BoldNonextended" charset="0"/>
+              </a:endParaRPr>
+            </a:p>
+          </p:txBody>
+        </p:sp>
+      </p:grpSp>
+      <p:sp>
+        <p:nvSpPr>
+          <p:cNvPr id="12" name="TextBox 11"/>
+          <p:cNvSpPr txBox="1"/>
+          <p:nvPr/>
+        </p:nvSpPr>
+        <p:spPr>
+          <a:xfrm>
+            <a:off x="7445894" y="4381669"/>
+            <a:ext cx="1176925" cy="338554"/>
+          </a:xfrm>
+          <a:prstGeom prst="rect">
+            <a:avLst/>
+          </a:prstGeom>
+          <a:noFill/>
+        </p:spPr>
+        <p:txBody>
+          <a:bodyPr wrap="none" rtlCol="0">
+            <a:spAutoFit/>
+          </a:bodyPr>
+          <a:lstStyle/>
+          <a:p>
+            <a:r>
+              <a:rPr lang="mr-IN" sz="1600" b="1" dirty="0">
+                <a:latin typeface="CMU Serif Extra BoldNonextended" charset="0"/>
+                <a:ea typeface="CMU Serif Extra BoldNonextended" charset="0"/>
+                <a:cs typeface="CMU Serif Extra BoldNonextended" charset="0"/>
+              </a:rPr>
+              <a:t>512-002598</a:t>
+            </a:r>
+            <a:endParaRPr lang="en-GB" sz="1600" b="1" dirty="0">
+              <a:latin typeface="CMU Serif Extra BoldNonextended" charset="0"/>
+              <a:ea typeface="CMU Serif Extra BoldNonextended" charset="0"/>
+              <a:cs typeface="CMU Serif Extra BoldNonextended" charset="0"/>
+            </a:endParaRPr>
+          </a:p>
+        </p:txBody>
+      </p:sp>
+    </p:spTree>
+    <p:extLst>
+      <p:ext uri="{BB962C8B-B14F-4D97-AF65-F5344CB8AC3E}">
+        <p14:creationId xmlns:p14="http://schemas.microsoft.com/office/powerpoint/2010/main" val="621734338"/>
+      </p:ext>
+    </p:extLst>
+  </p:cSld>
+  <p:clrMapOvr>
+    <a:masterClrMapping/>
+  </p:clrMapOvr>
+</p:sld>
+</file>
+
 <file path=ppt/theme/theme1.xml><?xml version="1.0" encoding="utf-8"?>
 <a:theme xmlns:a="http://schemas.openxmlformats.org/drawingml/2006/main" name="Office Theme">
   <a:themeElements>

</xml_diff>